<commit_message>
burnch for UI design
the, login ID/PW is fe/dd
if you type it login will disapire, and the list will come out
</commit_message>
<xml_diff>
--- a/project modelling.pptx
+++ b/project modelling.pptx
@@ -274,7 +274,7 @@
           <a:p>
             <a:fld id="{C4D58572-2E53-4261-946C-49CB56EFD4B2}" type="datetimeFigureOut">
               <a:rPr lang="ko-KR" altLang="en-US" smtClean="0"/>
-              <a:t>2021-04-21</a:t>
+              <a:t>2021-04-24</a:t>
             </a:fld>
             <a:endParaRPr lang="ko-KR" altLang="en-US"/>
           </a:p>
@@ -472,7 +472,7 @@
           <a:p>
             <a:fld id="{C4D58572-2E53-4261-946C-49CB56EFD4B2}" type="datetimeFigureOut">
               <a:rPr lang="ko-KR" altLang="en-US" smtClean="0"/>
-              <a:t>2021-04-21</a:t>
+              <a:t>2021-04-24</a:t>
             </a:fld>
             <a:endParaRPr lang="ko-KR" altLang="en-US"/>
           </a:p>
@@ -680,7 +680,7 @@
           <a:p>
             <a:fld id="{C4D58572-2E53-4261-946C-49CB56EFD4B2}" type="datetimeFigureOut">
               <a:rPr lang="ko-KR" altLang="en-US" smtClean="0"/>
-              <a:t>2021-04-21</a:t>
+              <a:t>2021-04-24</a:t>
             </a:fld>
             <a:endParaRPr lang="ko-KR" altLang="en-US"/>
           </a:p>
@@ -878,7 +878,7 @@
           <a:p>
             <a:fld id="{C4D58572-2E53-4261-946C-49CB56EFD4B2}" type="datetimeFigureOut">
               <a:rPr lang="ko-KR" altLang="en-US" smtClean="0"/>
-              <a:t>2021-04-21</a:t>
+              <a:t>2021-04-24</a:t>
             </a:fld>
             <a:endParaRPr lang="ko-KR" altLang="en-US"/>
           </a:p>
@@ -1153,7 +1153,7 @@
           <a:p>
             <a:fld id="{C4D58572-2E53-4261-946C-49CB56EFD4B2}" type="datetimeFigureOut">
               <a:rPr lang="ko-KR" altLang="en-US" smtClean="0"/>
-              <a:t>2021-04-21</a:t>
+              <a:t>2021-04-24</a:t>
             </a:fld>
             <a:endParaRPr lang="ko-KR" altLang="en-US"/>
           </a:p>
@@ -1418,7 +1418,7 @@
           <a:p>
             <a:fld id="{C4D58572-2E53-4261-946C-49CB56EFD4B2}" type="datetimeFigureOut">
               <a:rPr lang="ko-KR" altLang="en-US" smtClean="0"/>
-              <a:t>2021-04-21</a:t>
+              <a:t>2021-04-24</a:t>
             </a:fld>
             <a:endParaRPr lang="ko-KR" altLang="en-US"/>
           </a:p>
@@ -1830,7 +1830,7 @@
           <a:p>
             <a:fld id="{C4D58572-2E53-4261-946C-49CB56EFD4B2}" type="datetimeFigureOut">
               <a:rPr lang="ko-KR" altLang="en-US" smtClean="0"/>
-              <a:t>2021-04-21</a:t>
+              <a:t>2021-04-24</a:t>
             </a:fld>
             <a:endParaRPr lang="ko-KR" altLang="en-US"/>
           </a:p>
@@ -1971,7 +1971,7 @@
           <a:p>
             <a:fld id="{C4D58572-2E53-4261-946C-49CB56EFD4B2}" type="datetimeFigureOut">
               <a:rPr lang="ko-KR" altLang="en-US" smtClean="0"/>
-              <a:t>2021-04-21</a:t>
+              <a:t>2021-04-24</a:t>
             </a:fld>
             <a:endParaRPr lang="ko-KR" altLang="en-US"/>
           </a:p>
@@ -2084,7 +2084,7 @@
           <a:p>
             <a:fld id="{C4D58572-2E53-4261-946C-49CB56EFD4B2}" type="datetimeFigureOut">
               <a:rPr lang="ko-KR" altLang="en-US" smtClean="0"/>
-              <a:t>2021-04-21</a:t>
+              <a:t>2021-04-24</a:t>
             </a:fld>
             <a:endParaRPr lang="ko-KR" altLang="en-US"/>
           </a:p>
@@ -2395,7 +2395,7 @@
           <a:p>
             <a:fld id="{C4D58572-2E53-4261-946C-49CB56EFD4B2}" type="datetimeFigureOut">
               <a:rPr lang="ko-KR" altLang="en-US" smtClean="0"/>
-              <a:t>2021-04-21</a:t>
+              <a:t>2021-04-24</a:t>
             </a:fld>
             <a:endParaRPr lang="ko-KR" altLang="en-US"/>
           </a:p>
@@ -2683,7 +2683,7 @@
           <a:p>
             <a:fld id="{C4D58572-2E53-4261-946C-49CB56EFD4B2}" type="datetimeFigureOut">
               <a:rPr lang="ko-KR" altLang="en-US" smtClean="0"/>
-              <a:t>2021-04-21</a:t>
+              <a:t>2021-04-24</a:t>
             </a:fld>
             <a:endParaRPr lang="ko-KR" altLang="en-US"/>
           </a:p>
@@ -2924,7 +2924,7 @@
           <a:p>
             <a:fld id="{C4D58572-2E53-4261-946C-49CB56EFD4B2}" type="datetimeFigureOut">
               <a:rPr lang="ko-KR" altLang="en-US" smtClean="0"/>
-              <a:t>2021-04-21</a:t>
+              <a:t>2021-04-24</a:t>
             </a:fld>
             <a:endParaRPr lang="ko-KR" altLang="en-US"/>
           </a:p>
@@ -5950,6 +5950,203 @@
           </a:p>
         </p:txBody>
       </p:sp>
+      <p:sp>
+        <p:nvSpPr>
+          <p:cNvPr id="3" name="직사각형 2">
+            <a:extLst>
+              <a:ext uri="{FF2B5EF4-FFF2-40B4-BE49-F238E27FC236}">
+                <a16:creationId xmlns:a16="http://schemas.microsoft.com/office/drawing/2014/main" id="{A7AFD528-F8E3-4A79-BE25-C3A5615BC464}"/>
+              </a:ext>
+            </a:extLst>
+          </p:cNvPr>
+          <p:cNvSpPr/>
+          <p:nvPr/>
+        </p:nvSpPr>
+        <p:spPr>
+          <a:xfrm>
+            <a:off x="3556000" y="1041399"/>
+            <a:ext cx="795421" cy="282075"/>
+          </a:xfrm>
+          <a:prstGeom prst="rect">
+            <a:avLst/>
+          </a:prstGeom>
+        </p:spPr>
+        <p:style>
+          <a:lnRef idx="2">
+            <a:schemeClr val="accent1">
+              <a:shade val="50000"/>
+            </a:schemeClr>
+          </a:lnRef>
+          <a:fillRef idx="1">
+            <a:schemeClr val="accent1"/>
+          </a:fillRef>
+          <a:effectRef idx="0">
+            <a:schemeClr val="accent1"/>
+          </a:effectRef>
+          <a:fontRef idx="minor">
+            <a:schemeClr val="lt1"/>
+          </a:fontRef>
+        </p:style>
+        <p:txBody>
+          <a:bodyPr rtlCol="0" anchor="ctr"/>
+          <a:lstStyle/>
+          <a:p>
+            <a:pPr algn="ctr"/>
+            <a:r>
+              <a:rPr lang="ko-KR" altLang="en-US" dirty="0"/>
+              <a:t>정렬</a:t>
+            </a:r>
+            <a:endParaRPr lang="en-US" altLang="ko-KR" dirty="0"/>
+          </a:p>
+        </p:txBody>
+      </p:sp>
+      <p:sp>
+        <p:nvSpPr>
+          <p:cNvPr id="17" name="직사각형 16">
+            <a:extLst>
+              <a:ext uri="{FF2B5EF4-FFF2-40B4-BE49-F238E27FC236}">
+                <a16:creationId xmlns:a16="http://schemas.microsoft.com/office/drawing/2014/main" id="{153F670E-31B2-4F90-88B8-ED80850CAE89}"/>
+              </a:ext>
+            </a:extLst>
+          </p:cNvPr>
+          <p:cNvSpPr/>
+          <p:nvPr/>
+        </p:nvSpPr>
+        <p:spPr>
+          <a:xfrm>
+            <a:off x="4351421" y="1041399"/>
+            <a:ext cx="806585" cy="282075"/>
+          </a:xfrm>
+          <a:prstGeom prst="rect">
+            <a:avLst/>
+          </a:prstGeom>
+        </p:spPr>
+        <p:style>
+          <a:lnRef idx="2">
+            <a:schemeClr val="accent1">
+              <a:shade val="50000"/>
+            </a:schemeClr>
+          </a:lnRef>
+          <a:fillRef idx="1">
+            <a:schemeClr val="accent1"/>
+          </a:fillRef>
+          <a:effectRef idx="0">
+            <a:schemeClr val="accent1"/>
+          </a:effectRef>
+          <a:fontRef idx="minor">
+            <a:schemeClr val="lt1"/>
+          </a:fontRef>
+        </p:style>
+        <p:txBody>
+          <a:bodyPr rtlCol="0" anchor="ctr"/>
+          <a:lstStyle/>
+          <a:p>
+            <a:pPr algn="ctr"/>
+            <a:r>
+              <a:rPr lang="ko-KR" altLang="en-US" sz="1000" dirty="0"/>
+              <a:t>작성날짜</a:t>
+            </a:r>
+          </a:p>
+        </p:txBody>
+      </p:sp>
+      <p:sp>
+        <p:nvSpPr>
+          <p:cNvPr id="55" name="직사각형 54">
+            <a:extLst>
+              <a:ext uri="{FF2B5EF4-FFF2-40B4-BE49-F238E27FC236}">
+                <a16:creationId xmlns:a16="http://schemas.microsoft.com/office/drawing/2014/main" id="{39B344A5-11D7-420D-9676-FE4C26CD08DB}"/>
+              </a:ext>
+            </a:extLst>
+          </p:cNvPr>
+          <p:cNvSpPr/>
+          <p:nvPr/>
+        </p:nvSpPr>
+        <p:spPr>
+          <a:xfrm>
+            <a:off x="4351421" y="1338847"/>
+            <a:ext cx="806585" cy="282075"/>
+          </a:xfrm>
+          <a:prstGeom prst="rect">
+            <a:avLst/>
+          </a:prstGeom>
+        </p:spPr>
+        <p:style>
+          <a:lnRef idx="2">
+            <a:schemeClr val="accent1">
+              <a:shade val="50000"/>
+            </a:schemeClr>
+          </a:lnRef>
+          <a:fillRef idx="1">
+            <a:schemeClr val="accent1"/>
+          </a:fillRef>
+          <a:effectRef idx="0">
+            <a:schemeClr val="accent1"/>
+          </a:effectRef>
+          <a:fontRef idx="minor">
+            <a:schemeClr val="lt1"/>
+          </a:fontRef>
+        </p:style>
+        <p:txBody>
+          <a:bodyPr rtlCol="0" anchor="ctr"/>
+          <a:lstStyle/>
+          <a:p>
+            <a:pPr algn="ctr"/>
+            <a:r>
+              <a:rPr lang="ko-KR" altLang="en-US" sz="1000" dirty="0"/>
+              <a:t>예정날짜</a:t>
+            </a:r>
+          </a:p>
+        </p:txBody>
+      </p:sp>
+      <p:sp>
+        <p:nvSpPr>
+          <p:cNvPr id="56" name="직사각형 55">
+            <a:extLst>
+              <a:ext uri="{FF2B5EF4-FFF2-40B4-BE49-F238E27FC236}">
+                <a16:creationId xmlns:a16="http://schemas.microsoft.com/office/drawing/2014/main" id="{C6D0256A-E31B-4720-8148-C35C58ECF93A}"/>
+              </a:ext>
+            </a:extLst>
+          </p:cNvPr>
+          <p:cNvSpPr/>
+          <p:nvPr/>
+        </p:nvSpPr>
+        <p:spPr>
+          <a:xfrm>
+            <a:off x="838200" y="1286843"/>
+            <a:ext cx="806585" cy="282075"/>
+          </a:xfrm>
+          <a:prstGeom prst="rect">
+            <a:avLst/>
+          </a:prstGeom>
+        </p:spPr>
+        <p:style>
+          <a:lnRef idx="2">
+            <a:schemeClr val="accent1">
+              <a:shade val="50000"/>
+            </a:schemeClr>
+          </a:lnRef>
+          <a:fillRef idx="1">
+            <a:schemeClr val="accent1"/>
+          </a:fillRef>
+          <a:effectRef idx="0">
+            <a:schemeClr val="accent1"/>
+          </a:effectRef>
+          <a:fontRef idx="minor">
+            <a:schemeClr val="lt1"/>
+          </a:fontRef>
+        </p:style>
+        <p:txBody>
+          <a:bodyPr rtlCol="0" anchor="ctr"/>
+          <a:lstStyle/>
+          <a:p>
+            <a:pPr algn="ctr"/>
+            <a:r>
+              <a:rPr lang="ko-KR" altLang="en-US" sz="1000" dirty="0"/>
+              <a:t>오름차순</a:t>
+            </a:r>
+          </a:p>
+        </p:txBody>
+      </p:sp>
     </p:spTree>
     <p:extLst>
       <p:ext uri="{BB962C8B-B14F-4D97-AF65-F5344CB8AC3E}">

</xml_diff>